<commit_message>
Renamed EXCHG RW-Lock to CLH RW-Lock
</commit_message>
<xml_diff>
--- a/Presentations/CLH-Mutex.pptx
+++ b/Presentations/CLH-Mutex.pptx
@@ -4637,11 +4637,7 @@
           <a:p>
             <a:r>
               <a:rPr lang="en-US" sz="3200" dirty="0" smtClean="0"/>
-              <a:t>CLH </a:t>
-            </a:r>
-            <a:r>
-              <a:rPr lang="en-US" sz="3200" dirty="0" smtClean="0"/>
-              <a:t>Mutually Exclusive Lock</a:t>
+              <a:t>CLH Mutually Exclusive Lock</a:t>
             </a:r>
             <a:endParaRPr lang="en-US" sz="3200" dirty="0"/>
           </a:p>
@@ -4756,51 +4752,63 @@
           <a:lstStyle/>
           <a:p>
             <a:r>
+              <a:rPr lang="en-US" sz="1600" dirty="0"/>
+              <a:t>A mutual exclusion lock discovered independently by Travis Craig at the </a:t>
+            </a:r>
+            <a:r>
               <a:rPr lang="en-US" sz="1600" dirty="0" smtClean="0"/>
-              <a:t>It’s a </a:t>
-            </a:r>
-            <a:r>
-              <a:rPr lang="en-US" sz="1600" dirty="0" err="1" smtClean="0"/>
-              <a:t>mutex</a:t>
+              <a:t>University </a:t>
+            </a:r>
+            <a:r>
+              <a:rPr lang="en-US" sz="1600" dirty="0"/>
+              <a:t>of Washington (UW TR 93-02-02, February 1993), and by </a:t>
             </a:r>
             <a:r>
               <a:rPr lang="en-US" sz="1600" dirty="0" smtClean="0"/>
-              <a:t> with similarities with the MCS </a:t>
+              <a:t>Anders </a:t>
+            </a:r>
+            <a:r>
+              <a:rPr lang="en-US" sz="1600" dirty="0"/>
+              <a:t>Landin and Eric </a:t>
+            </a:r>
+            <a:r>
+              <a:rPr lang="en-US" sz="1600" dirty="0" err="1"/>
+              <a:t>Hagersten</a:t>
+            </a:r>
+            <a:r>
+              <a:rPr lang="en-US" sz="1600" dirty="0"/>
+              <a:t> of the Swedish Institute of Computer Science (IPPS, 1994</a:t>
             </a:r>
             <a:r>
               <a:rPr lang="en-US" sz="1600" dirty="0" smtClean="0"/>
-              <a:t>Lock, and it was </a:t>
-            </a:r>
-            <a:endParaRPr lang="en-US" sz="1600" dirty="0"/>
-          </a:p>
-          <a:p>
-            <a:pPr marL="274320" lvl="1" indent="0">
+              <a:t>).</a:t>
+            </a:r>
+          </a:p>
+          <a:p>
+            <a:pPr marL="365760" lvl="1" indent="0">
               <a:buNone/>
             </a:pPr>
             <a:r>
-              <a:rPr lang="en-US" sz="1100" dirty="0" smtClean="0">
+              <a:rPr lang="en-US" sz="1200" dirty="0" smtClean="0">
                 <a:hlinkClick r:id="rId2"/>
               </a:rPr>
               <a:t>http</a:t>
             </a:r>
             <a:r>
-              <a:rPr lang="en-US" sz="1100" dirty="0">
+              <a:rPr lang="en-US" sz="1200" dirty="0">
                 <a:hlinkClick r:id="rId2"/>
               </a:rPr>
               <a:t>://</a:t>
             </a:r>
             <a:r>
-              <a:rPr lang="en-US" sz="1100" dirty="0" smtClean="0">
+              <a:rPr lang="en-US" sz="1200" dirty="0" smtClean="0">
                 <a:hlinkClick r:id="rId2"/>
               </a:rPr>
-              <a:t>www.cise.ufl.edu/tr/DOC/REP-1992-71.pdf</a:t>
-            </a:r>
-            <a:endParaRPr lang="en-US" sz="1100" dirty="0" smtClean="0"/>
-          </a:p>
-          <a:p>
-            <a:pPr marL="0" indent="0">
-              <a:buNone/>
-            </a:pPr>
+              <a:t>www.cs.rochester.edu/research/synchronization/pseudocode/ss.html#clh</a:t>
+            </a:r>
+            <a:endParaRPr lang="en-US" sz="1200" dirty="0" smtClean="0"/>
+          </a:p>
+          <a:p>
             <a:endParaRPr lang="en-US" sz="1600" dirty="0" smtClean="0"/>
           </a:p>
           <a:p>
@@ -4898,11 +4906,7 @@
           <a:p>
             <a:r>
               <a:rPr lang="en-US" dirty="0" smtClean="0"/>
-              <a:t>What is </a:t>
-            </a:r>
-            <a:r>
-              <a:rPr lang="en-US" dirty="0" smtClean="0"/>
-              <a:t>the CLH</a:t>
+              <a:t>What is the CLH</a:t>
             </a:r>
             <a:endParaRPr lang="en-US" dirty="0"/>
           </a:p>
@@ -5222,11 +5226,11 @@
           <a:p>
             <a:pPr algn="ctr"/>
             <a:r>
-              <a:rPr lang="en-US" sz="1400" dirty="0" err="1"/>
-              <a:t>islocked</a:t>
-            </a:r>
-            <a:r>
-              <a:rPr lang="en-US" sz="1400" dirty="0"/>
+              <a:rPr lang="en-US" sz="1200" dirty="0" err="1"/>
+              <a:t>must_wait</a:t>
+            </a:r>
+            <a:r>
+              <a:rPr lang="en-US" sz="1200" dirty="0"/>
               <a:t> 1</a:t>
             </a:r>
           </a:p>
@@ -5333,11 +5337,7 @@
             </a:r>
             <a:r>
               <a:rPr lang="en-US" sz="1600" dirty="0" smtClean="0"/>
-              <a:t>=1 </a:t>
-            </a:r>
-            <a:r>
-              <a:rPr lang="en-US" sz="1600" dirty="0" smtClean="0"/>
-              <a:t>and does </a:t>
+              <a:t>=1 and does </a:t>
             </a:r>
             <a:r>
               <a:rPr lang="en-US" sz="1600" dirty="0" err="1" smtClean="0"/>
@@ -5362,11 +5362,7 @@
             </a:r>
             <a:r>
               <a:rPr lang="en-US" sz="1600" dirty="0" smtClean="0"/>
-              <a:t>=1 </a:t>
-            </a:r>
-            <a:r>
-              <a:rPr lang="en-US" sz="1600" dirty="0" smtClean="0"/>
-              <a:t>on their </a:t>
+              <a:t>=1 on their </a:t>
             </a:r>
             <a:r>
               <a:rPr lang="en-US" sz="1600" i="1" dirty="0" smtClean="0"/>
@@ -5594,14 +5590,14 @@
           <a:p>
             <a:pPr algn="ctr"/>
             <a:r>
-              <a:rPr lang="en-US" sz="1400" dirty="0" err="1" smtClean="0"/>
-              <a:t>islocked</a:t>
-            </a:r>
-            <a:r>
-              <a:rPr lang="en-US" sz="1400" dirty="0" smtClean="0"/>
+              <a:rPr lang="en-US" sz="1200" dirty="0" err="1"/>
+              <a:t>must_wait</a:t>
+            </a:r>
+            <a:r>
+              <a:rPr lang="en-US" sz="1200" dirty="0"/>
               <a:t> 1</a:t>
             </a:r>
-            <a:endParaRPr lang="en-US" sz="1600" dirty="0"/>
+            <a:endParaRPr lang="en-US" sz="1400" dirty="0"/>
           </a:p>
         </p:txBody>
       </p:sp>
@@ -7706,14 +7702,14 @@
           <a:p>
             <a:pPr algn="ctr"/>
             <a:r>
-              <a:rPr lang="en-US" sz="1400" dirty="0" err="1" smtClean="0"/>
-              <a:t>islocked</a:t>
-            </a:r>
-            <a:r>
-              <a:rPr lang="en-US" sz="1400" dirty="0" smtClean="0"/>
+              <a:rPr lang="en-US" sz="1200" dirty="0" err="1" smtClean="0"/>
+              <a:t>must_wait</a:t>
+            </a:r>
+            <a:r>
+              <a:rPr lang="en-US" sz="1200" dirty="0" smtClean="0"/>
               <a:t> 0</a:t>
             </a:r>
-            <a:endParaRPr lang="en-US" sz="1600" dirty="0"/>
+            <a:endParaRPr lang="en-US" sz="1400" dirty="0"/>
           </a:p>
         </p:txBody>
       </p:sp>
@@ -7804,11 +7800,11 @@
           <a:p>
             <a:pPr algn="ctr"/>
             <a:r>
-              <a:rPr lang="en-US" sz="1400" dirty="0" err="1"/>
-              <a:t>islocked</a:t>
-            </a:r>
-            <a:r>
-              <a:rPr lang="en-US" sz="1400" dirty="0"/>
+              <a:rPr lang="en-US" sz="1200" dirty="0" err="1"/>
+              <a:t>must_wait</a:t>
+            </a:r>
+            <a:r>
+              <a:rPr lang="en-US" sz="1200" dirty="0"/>
               <a:t> 1</a:t>
             </a:r>
           </a:p>
@@ -7822,7 +7818,7 @@
         </p:nvSpPr>
         <p:spPr>
           <a:xfrm>
-            <a:off x="2438400" y="4860217"/>
+            <a:off x="2438400" y="4865932"/>
             <a:ext cx="1219200" cy="197644"/>
           </a:xfrm>
           <a:prstGeom prst="rect">
@@ -7859,14 +7855,14 @@
           <a:p>
             <a:pPr algn="ctr"/>
             <a:r>
-              <a:rPr lang="en-US" sz="1400" dirty="0" err="1" smtClean="0"/>
-              <a:t>islocked</a:t>
-            </a:r>
-            <a:r>
-              <a:rPr lang="en-US" sz="1400" dirty="0" smtClean="0"/>
+              <a:rPr lang="en-US" sz="1200" dirty="0" err="1"/>
+              <a:t>must_wait</a:t>
+            </a:r>
+            <a:r>
+              <a:rPr lang="en-US" sz="1200" dirty="0"/>
               <a:t> 0</a:t>
             </a:r>
-            <a:endParaRPr lang="en-US" sz="1600" dirty="0"/>
+            <a:endParaRPr lang="en-US" sz="1400" dirty="0"/>
           </a:p>
         </p:txBody>
       </p:sp>
@@ -7878,7 +7874,7 @@
         </p:nvSpPr>
         <p:spPr>
           <a:xfrm>
-            <a:off x="4476750" y="4863971"/>
+            <a:off x="4485803" y="4860217"/>
             <a:ext cx="1219200" cy="197644"/>
           </a:xfrm>
           <a:prstGeom prst="rect">
@@ -7915,14 +7911,14 @@
           <a:p>
             <a:pPr algn="ctr"/>
             <a:r>
-              <a:rPr lang="en-US" sz="1400" dirty="0" err="1" smtClean="0"/>
-              <a:t>islocked</a:t>
-            </a:r>
-            <a:r>
-              <a:rPr lang="en-US" sz="1400" dirty="0" smtClean="0"/>
+              <a:rPr lang="en-US" sz="1200" dirty="0" err="1"/>
+              <a:t>must_wait</a:t>
+            </a:r>
+            <a:r>
+              <a:rPr lang="en-US" sz="1200" dirty="0"/>
               <a:t> 0</a:t>
             </a:r>
-            <a:endParaRPr lang="en-US" sz="1600" dirty="0"/>
+            <a:endParaRPr lang="en-US" sz="1400" dirty="0"/>
           </a:p>
         </p:txBody>
       </p:sp>

</xml_diff>